<commit_message>
Stop donation on already reciveved requests
</commit_message>
<xml_diff>
--- a/Other/Project Review - Chapter  2 Episode 1.pptx
+++ b/Other/Project Review - Chapter  2 Episode 1.pptx
@@ -5,19 +5,18 @@
     <p:sldMasterId id="2147483648" r:id="rId4"/>
   </p:sldMasterIdLst>
   <p:notesMasterIdLst>
-    <p:notesMasterId r:id="rId12"/>
+    <p:notesMasterId r:id="rId11"/>
   </p:notesMasterIdLst>
   <p:handoutMasterIdLst>
-    <p:handoutMasterId r:id="rId13"/>
+    <p:handoutMasterId r:id="rId12"/>
   </p:handoutMasterIdLst>
   <p:sldIdLst>
     <p:sldId id="324" r:id="rId5"/>
     <p:sldId id="302" r:id="rId6"/>
     <p:sldId id="314" r:id="rId7"/>
     <p:sldId id="315" r:id="rId8"/>
-    <p:sldId id="312" r:id="rId9"/>
-    <p:sldId id="325" r:id="rId10"/>
-    <p:sldId id="313" r:id="rId11"/>
+    <p:sldId id="325" r:id="rId9"/>
+    <p:sldId id="313" r:id="rId10"/>
   </p:sldIdLst>
   <p:sldSz cx="12192000" cy="6858000"/>
   <p:notesSz cx="6858000" cy="9144000"/>
@@ -247,7 +246,7 @@
           <a:p>
             <a:fld id="{EF1077DB-935E-4A0A-947A-D283B9F9F452}" type="datetimeFigureOut">
               <a:rPr lang="en-US" smtClean="0"/>
-              <a:t>4/2/2022</a:t>
+              <a:t>6/11/2022</a:t>
             </a:fld>
             <a:endParaRPr lang="en-US" dirty="0"/>
           </a:p>
@@ -424,7 +423,7 @@
           <a:p>
             <a:fld id="{2D9EC30E-1A71-4188-9BE7-E2A64929A436}" type="datetimeFigureOut">
               <a:rPr lang="en-US" noProof="0" smtClean="0"/>
-              <a:t>4/2/2022</a:t>
+              <a:t>6/11/2022</a:t>
             </a:fld>
             <a:endParaRPr lang="en-US" noProof="0" dirty="0"/>
           </a:p>
@@ -1071,7 +1070,7 @@
           <a:bodyPr/>
           <a:lstStyle/>
           <a:p>
-            <a:endParaRPr lang="en-US" dirty="0"/>
+            <a:endParaRPr lang="en-IN"/>
           </a:p>
         </p:txBody>
       </p:sp>
@@ -1093,90 +1092,6 @@
             <a:fld id="{8530193B-564F-4854-8A52-728F3FB19C85}" type="slidenum">
               <a:rPr lang="en-US" noProof="0" smtClean="0"/>
               <a:t>5</a:t>
-            </a:fld>
-            <a:endParaRPr lang="en-US" noProof="0" dirty="0"/>
-          </a:p>
-        </p:txBody>
-      </p:sp>
-    </p:spTree>
-    <p:extLst>
-      <p:ext uri="{BB962C8B-B14F-4D97-AF65-F5344CB8AC3E}">
-        <p14:creationId xmlns:p14="http://schemas.microsoft.com/office/powerpoint/2010/main" val="3397440489"/>
-      </p:ext>
-    </p:extLst>
-  </p:cSld>
-  <p:clrMapOvr>
-    <a:masterClrMapping/>
-  </p:clrMapOvr>
-</p:notes>
-</file>
-
-<file path=ppt/notesSlides/notesSlide6.xml><?xml version="1.0" encoding="utf-8"?>
-<p:notes xmlns:a="http://schemas.openxmlformats.org/drawingml/2006/main" xmlns:r="http://schemas.openxmlformats.org/officeDocument/2006/relationships" xmlns:p="http://schemas.openxmlformats.org/presentationml/2006/main">
-  <p:cSld>
-    <p:spTree>
-      <p:nvGrpSpPr>
-        <p:cNvPr id="1" name=""/>
-        <p:cNvGrpSpPr/>
-        <p:nvPr/>
-      </p:nvGrpSpPr>
-      <p:grpSpPr>
-        <a:xfrm>
-          <a:off x="0" y="0"/>
-          <a:ext cx="0" cy="0"/>
-          <a:chOff x="0" y="0"/>
-          <a:chExt cx="0" cy="0"/>
-        </a:xfrm>
-      </p:grpSpPr>
-      <p:sp>
-        <p:nvSpPr>
-          <p:cNvPr id="2" name="Slide Image Placeholder 1"/>
-          <p:cNvSpPr>
-            <a:spLocks noGrp="1" noRot="1" noChangeAspect="1"/>
-          </p:cNvSpPr>
-          <p:nvPr>
-            <p:ph type="sldImg"/>
-          </p:nvPr>
-        </p:nvSpPr>
-        <p:spPr/>
-      </p:sp>
-      <p:sp>
-        <p:nvSpPr>
-          <p:cNvPr id="3" name="Notes Placeholder 2"/>
-          <p:cNvSpPr>
-            <a:spLocks noGrp="1"/>
-          </p:cNvSpPr>
-          <p:nvPr>
-            <p:ph type="body" idx="1"/>
-          </p:nvPr>
-        </p:nvSpPr>
-        <p:spPr/>
-        <p:txBody>
-          <a:bodyPr/>
-          <a:lstStyle/>
-          <a:p>
-            <a:endParaRPr lang="en-IN"/>
-          </a:p>
-        </p:txBody>
-      </p:sp>
-      <p:sp>
-        <p:nvSpPr>
-          <p:cNvPr id="4" name="Slide Number Placeholder 3"/>
-          <p:cNvSpPr>
-            <a:spLocks noGrp="1"/>
-          </p:cNvSpPr>
-          <p:nvPr>
-            <p:ph type="sldNum" sz="quarter" idx="5"/>
-          </p:nvPr>
-        </p:nvSpPr>
-        <p:spPr/>
-        <p:txBody>
-          <a:bodyPr/>
-          <a:lstStyle/>
-          <a:p>
-            <a:fld id="{8530193B-564F-4854-8A52-728F3FB19C85}" type="slidenum">
-              <a:rPr lang="en-US" noProof="0" smtClean="0"/>
-              <a:t>6</a:t>
             </a:fld>
             <a:endParaRPr lang="en-US" noProof="0" dirty="0"/>
           </a:p>
@@ -10744,1228 +10659,6 @@
 </file>
 
 <file path=ppt/slides/slide5.xml><?xml version="1.0" encoding="utf-8"?>
-<p:sld xmlns:a="http://schemas.openxmlformats.org/drawingml/2006/main" xmlns:r="http://schemas.openxmlformats.org/officeDocument/2006/relationships" xmlns:p="http://schemas.openxmlformats.org/presentationml/2006/main">
-  <p:cSld>
-    <p:bg>
-      <p:bgPr>
-        <a:solidFill>
-          <a:schemeClr val="bg1">
-            <a:lumMod val="95000"/>
-          </a:schemeClr>
-        </a:solidFill>
-        <a:effectLst/>
-      </p:bgPr>
-    </p:bg>
-    <p:spTree>
-      <p:nvGrpSpPr>
-        <p:cNvPr id="1" name=""/>
-        <p:cNvGrpSpPr/>
-        <p:nvPr/>
-      </p:nvGrpSpPr>
-      <p:grpSpPr>
-        <a:xfrm>
-          <a:off x="0" y="0"/>
-          <a:ext cx="0" cy="0"/>
-          <a:chOff x="0" y="0"/>
-          <a:chExt cx="0" cy="0"/>
-        </a:xfrm>
-      </p:grpSpPr>
-      <p:sp>
-        <p:nvSpPr>
-          <p:cNvPr id="2" name="Title 1">
-            <a:extLst>
-              <a:ext uri="{FF2B5EF4-FFF2-40B4-BE49-F238E27FC236}">
-                <a16:creationId xmlns:a16="http://schemas.microsoft.com/office/drawing/2014/main" id="{1B67F211-ED25-4BED-862A-17F84B323349}"/>
-              </a:ext>
-            </a:extLst>
-          </p:cNvPr>
-          <p:cNvSpPr>
-            <a:spLocks noGrp="1"/>
-          </p:cNvSpPr>
-          <p:nvPr>
-            <p:ph type="title"/>
-          </p:nvPr>
-        </p:nvSpPr>
-        <p:spPr/>
-        <p:txBody>
-          <a:bodyPr/>
-          <a:lstStyle/>
-          <a:p>
-            <a:r>
-              <a:rPr lang="en-US" dirty="0"/>
-              <a:t>Key Points</a:t>
-            </a:r>
-            <a:br>
-              <a:rPr lang="en-US" dirty="0"/>
-            </a:br>
-            <a:endParaRPr lang="en-US" dirty="0"/>
-          </a:p>
-        </p:txBody>
-      </p:sp>
-      <p:sp>
-        <p:nvSpPr>
-          <p:cNvPr id="18" name="Hexagon 17">
-            <a:extLst>
-              <a:ext uri="{FF2B5EF4-FFF2-40B4-BE49-F238E27FC236}">
-                <a16:creationId xmlns:a16="http://schemas.microsoft.com/office/drawing/2014/main" id="{F3A0DAD0-3E39-4BBF-88E4-5C3C306DCCBB}"/>
-              </a:ext>
-              <a:ext uri="{C183D7F6-B498-43B3-948B-1728B52AA6E4}">
-                <adec:decorative xmlns:adec="http://schemas.microsoft.com/office/drawing/2017/decorative" val="1"/>
-              </a:ext>
-            </a:extLst>
-          </p:cNvPr>
-          <p:cNvSpPr/>
-          <p:nvPr/>
-        </p:nvSpPr>
-        <p:spPr>
-          <a:xfrm>
-            <a:off x="609018" y="2105016"/>
-            <a:ext cx="914400" cy="764219"/>
-          </a:xfrm>
-          <a:prstGeom prst="hexagon">
-            <a:avLst/>
-          </a:prstGeom>
-          <a:noFill/>
-          <a:ln>
-            <a:solidFill>
-              <a:schemeClr val="bg1">
-                <a:lumMod val="75000"/>
-              </a:schemeClr>
-            </a:solidFill>
-          </a:ln>
-        </p:spPr>
-        <p:style>
-          <a:lnRef idx="2">
-            <a:schemeClr val="accent1">
-              <a:shade val="50000"/>
-            </a:schemeClr>
-          </a:lnRef>
-          <a:fillRef idx="1">
-            <a:schemeClr val="accent1"/>
-          </a:fillRef>
-          <a:effectRef idx="0">
-            <a:schemeClr val="accent1"/>
-          </a:effectRef>
-          <a:fontRef idx="minor">
-            <a:schemeClr val="lt1"/>
-          </a:fontRef>
-        </p:style>
-        <p:txBody>
-          <a:bodyPr rtlCol="0" anchor="ctr"/>
-          <a:lstStyle/>
-          <a:p>
-            <a:pPr algn="ctr"/>
-            <a:endParaRPr lang="en-US" dirty="0"/>
-          </a:p>
-        </p:txBody>
-      </p:sp>
-      <p:pic>
-        <p:nvPicPr>
-          <p:cNvPr id="16" name="Graphic 15" descr="Target Audience">
-            <a:extLst>
-              <a:ext uri="{FF2B5EF4-FFF2-40B4-BE49-F238E27FC236}">
-                <a16:creationId xmlns:a16="http://schemas.microsoft.com/office/drawing/2014/main" id="{C4663C19-45BD-46CB-AA38-6CE7C4522BC9}"/>
-              </a:ext>
-            </a:extLst>
-          </p:cNvPr>
-          <p:cNvPicPr>
-            <a:picLocks noChangeAspect="1"/>
-          </p:cNvPicPr>
-          <p:nvPr/>
-        </p:nvPicPr>
-        <p:blipFill>
-          <a:blip r:embed="rId3">
-            <a:extLst>
-              <a:ext uri="{96DAC541-7B7A-43D3-8B79-37D633B846F1}">
-                <asvg:svgBlip xmlns:asvg="http://schemas.microsoft.com/office/drawing/2016/SVG/main" r:embed="rId4"/>
-              </a:ext>
-            </a:extLst>
-          </a:blip>
-          <a:stretch>
-            <a:fillRect/>
-          </a:stretch>
-        </p:blipFill>
-        <p:spPr>
-          <a:xfrm>
-            <a:off x="793513" y="2204476"/>
-            <a:ext cx="548640" cy="548640"/>
-          </a:xfrm>
-          <a:prstGeom prst="rect">
-            <a:avLst/>
-          </a:prstGeom>
-        </p:spPr>
-      </p:pic>
-      <p:sp>
-        <p:nvSpPr>
-          <p:cNvPr id="11" name="TextBox 10">
-            <a:extLst>
-              <a:ext uri="{FF2B5EF4-FFF2-40B4-BE49-F238E27FC236}">
-                <a16:creationId xmlns:a16="http://schemas.microsoft.com/office/drawing/2014/main" id="{0A302878-D117-49D8-8CD3-093E34DF215B}"/>
-              </a:ext>
-            </a:extLst>
-          </p:cNvPr>
-          <p:cNvSpPr txBox="1"/>
-          <p:nvPr/>
-        </p:nvSpPr>
-        <p:spPr>
-          <a:xfrm>
-            <a:off x="1748531" y="2125176"/>
-            <a:ext cx="3657600" cy="913070"/>
-          </a:xfrm>
-          <a:prstGeom prst="rect">
-            <a:avLst/>
-          </a:prstGeom>
-          <a:noFill/>
-        </p:spPr>
-        <p:txBody>
-          <a:bodyPr wrap="square">
-            <a:spAutoFit/>
-          </a:bodyPr>
-          <a:lstStyle/>
-          <a:p>
-            <a:pPr marL="0" marR="0" lvl="0" indent="0" algn="l" defTabSz="914400" rtl="0" eaLnBrk="1" fontAlgn="auto" latinLnBrk="0" hangingPunct="1">
-              <a:lnSpc>
-                <a:spcPct val="90000"/>
-              </a:lnSpc>
-              <a:spcBef>
-                <a:spcPts val="1000"/>
-              </a:spcBef>
-              <a:spcAft>
-                <a:spcPts val="0"/>
-              </a:spcAft>
-              <a:buClrTx/>
-              <a:buSzTx/>
-              <a:buFont typeface="Arial" panose="020B0604020202020204" pitchFamily="34" charset="0"/>
-              <a:buNone/>
-              <a:tabLst/>
-              <a:defRPr/>
-            </a:pPr>
-            <a:r>
-              <a:rPr lang="en-US" b="1" dirty="0">
-                <a:solidFill>
-                  <a:schemeClr val="accent4"/>
-                </a:solidFill>
-                <a:latin typeface="+mj-lt"/>
-                <a:cs typeface="Biome Light" panose="020B0303030204020804" pitchFamily="34" charset="0"/>
-              </a:rPr>
-              <a:t>Best under Crowd</a:t>
-            </a:r>
-          </a:p>
-          <a:p>
-            <a:pPr marL="0" marR="0" lvl="0" indent="0" algn="l" defTabSz="914400" rtl="0" eaLnBrk="1" fontAlgn="auto" latinLnBrk="0" hangingPunct="1">
-              <a:lnSpc>
-                <a:spcPct val="90000"/>
-              </a:lnSpc>
-              <a:spcBef>
-                <a:spcPts val="1000"/>
-              </a:spcBef>
-              <a:spcAft>
-                <a:spcPts val="0"/>
-              </a:spcAft>
-              <a:buClrTx/>
-              <a:buSzTx/>
-              <a:buFont typeface="Arial" panose="020B0604020202020204" pitchFamily="34" charset="0"/>
-              <a:buNone/>
-              <a:tabLst/>
-              <a:defRPr/>
-            </a:pPr>
-            <a:r>
-              <a:rPr lang="en-US" sz="1600" dirty="0">
-                <a:cs typeface="Biome Light" panose="020B0303030204020804" pitchFamily="34" charset="0"/>
-              </a:rPr>
-              <a:t>A person with skills but in need of financial aid can be easily found.</a:t>
-            </a:r>
-            <a:endParaRPr kumimoji="0" lang="en-US" sz="1600" b="0" i="0" u="none" strike="noStrike" kern="1200" cap="none" spc="0" normalizeH="0" baseline="0" noProof="0" dirty="0">
-              <a:ln>
-                <a:noFill/>
-              </a:ln>
-              <a:effectLst/>
-              <a:uLnTx/>
-              <a:uFillTx/>
-              <a:latin typeface="+mn-lt"/>
-              <a:ea typeface="+mn-ea"/>
-              <a:cs typeface="Biome Light" panose="020B0303030204020804" pitchFamily="34" charset="0"/>
-            </a:endParaRPr>
-          </a:p>
-        </p:txBody>
-      </p:sp>
-      <p:sp>
-        <p:nvSpPr>
-          <p:cNvPr id="24" name="Hexagon 23">
-            <a:extLst>
-              <a:ext uri="{FF2B5EF4-FFF2-40B4-BE49-F238E27FC236}">
-                <a16:creationId xmlns:a16="http://schemas.microsoft.com/office/drawing/2014/main" id="{B8F5A225-0C56-4A56-9265-DBE9001CCCDC}"/>
-              </a:ext>
-              <a:ext uri="{C183D7F6-B498-43B3-948B-1728B52AA6E4}">
-                <adec:decorative xmlns:adec="http://schemas.microsoft.com/office/drawing/2017/decorative" val="1"/>
-              </a:ext>
-            </a:extLst>
-          </p:cNvPr>
-          <p:cNvSpPr/>
-          <p:nvPr/>
-        </p:nvSpPr>
-        <p:spPr>
-          <a:xfrm>
-            <a:off x="6382827" y="2105016"/>
-            <a:ext cx="914400" cy="764219"/>
-          </a:xfrm>
-          <a:prstGeom prst="hexagon">
-            <a:avLst/>
-          </a:prstGeom>
-          <a:noFill/>
-          <a:ln>
-            <a:solidFill>
-              <a:schemeClr val="bg1">
-                <a:lumMod val="75000"/>
-              </a:schemeClr>
-            </a:solidFill>
-          </a:ln>
-        </p:spPr>
-        <p:style>
-          <a:lnRef idx="2">
-            <a:schemeClr val="accent1">
-              <a:shade val="50000"/>
-            </a:schemeClr>
-          </a:lnRef>
-          <a:fillRef idx="1">
-            <a:schemeClr val="accent1"/>
-          </a:fillRef>
-          <a:effectRef idx="0">
-            <a:schemeClr val="accent1"/>
-          </a:effectRef>
-          <a:fontRef idx="minor">
-            <a:schemeClr val="lt1"/>
-          </a:fontRef>
-        </p:style>
-        <p:txBody>
-          <a:bodyPr rtlCol="0" anchor="ctr"/>
-          <a:lstStyle/>
-          <a:p>
-            <a:pPr algn="ctr"/>
-            <a:endParaRPr lang="en-US" dirty="0"/>
-          </a:p>
-        </p:txBody>
-      </p:sp>
-      <p:pic>
-        <p:nvPicPr>
-          <p:cNvPr id="34" name="Graphic 33" descr="Upward trend">
-            <a:extLst>
-              <a:ext uri="{FF2B5EF4-FFF2-40B4-BE49-F238E27FC236}">
-                <a16:creationId xmlns:a16="http://schemas.microsoft.com/office/drawing/2014/main" id="{112CEB44-CF96-4193-8126-3EF3F89B2EA2}"/>
-              </a:ext>
-            </a:extLst>
-          </p:cNvPr>
-          <p:cNvPicPr>
-            <a:picLocks noChangeAspect="1"/>
-          </p:cNvPicPr>
-          <p:nvPr/>
-        </p:nvPicPr>
-        <p:blipFill>
-          <a:blip r:embed="rId5">
-            <a:extLst>
-              <a:ext uri="{96DAC541-7B7A-43D3-8B79-37D633B846F1}">
-                <asvg:svgBlip xmlns:asvg="http://schemas.microsoft.com/office/drawing/2016/SVG/main" r:embed="rId6"/>
-              </a:ext>
-            </a:extLst>
-          </a:blip>
-          <a:srcRect/>
-          <a:stretch/>
-        </p:blipFill>
-        <p:spPr>
-          <a:xfrm>
-            <a:off x="6562762" y="2203745"/>
-            <a:ext cx="548640" cy="548640"/>
-          </a:xfrm>
-          <a:prstGeom prst="rect">
-            <a:avLst/>
-          </a:prstGeom>
-        </p:spPr>
-      </p:pic>
-      <p:sp>
-        <p:nvSpPr>
-          <p:cNvPr id="7" name="TextBox 6">
-            <a:extLst>
-              <a:ext uri="{FF2B5EF4-FFF2-40B4-BE49-F238E27FC236}">
-                <a16:creationId xmlns:a16="http://schemas.microsoft.com/office/drawing/2014/main" id="{64DBD184-BCBE-4A38-8DF2-C0C550ADE4C4}"/>
-              </a:ext>
-            </a:extLst>
-          </p:cNvPr>
-          <p:cNvSpPr txBox="1"/>
-          <p:nvPr/>
-        </p:nvSpPr>
-        <p:spPr>
-          <a:xfrm>
-            <a:off x="7504293" y="2125176"/>
-            <a:ext cx="3657600" cy="913070"/>
-          </a:xfrm>
-          <a:prstGeom prst="rect">
-            <a:avLst/>
-          </a:prstGeom>
-          <a:noFill/>
-        </p:spPr>
-        <p:txBody>
-          <a:bodyPr wrap="square">
-            <a:spAutoFit/>
-          </a:bodyPr>
-          <a:lstStyle/>
-          <a:p>
-            <a:pPr marL="0" marR="0" lvl="0" indent="0" algn="l" defTabSz="914400" rtl="0" eaLnBrk="1" fontAlgn="auto" latinLnBrk="0" hangingPunct="1">
-              <a:lnSpc>
-                <a:spcPct val="90000"/>
-              </a:lnSpc>
-              <a:spcBef>
-                <a:spcPts val="1000"/>
-              </a:spcBef>
-              <a:spcAft>
-                <a:spcPts val="0"/>
-              </a:spcAft>
-              <a:buClrTx/>
-              <a:buSzTx/>
-              <a:buFont typeface="Arial" panose="020B0604020202020204" pitchFamily="34" charset="0"/>
-              <a:buNone/>
-              <a:tabLst/>
-              <a:defRPr/>
-            </a:pPr>
-            <a:r>
-              <a:rPr lang="en-US" b="1" dirty="0">
-                <a:solidFill>
-                  <a:schemeClr val="accent4"/>
-                </a:solidFill>
-                <a:latin typeface="+mj-lt"/>
-                <a:cs typeface="Biome Light" panose="020B0303030204020804" pitchFamily="34" charset="0"/>
-              </a:rPr>
-              <a:t>A</a:t>
-            </a:r>
-            <a:r>
-              <a:rPr kumimoji="0" lang="en-US" b="1" i="0" u="none" strike="noStrike" kern="1200" cap="none" spc="0" normalizeH="0" baseline="0" noProof="0" dirty="0" err="1">
-                <a:ln>
-                  <a:noFill/>
-                </a:ln>
-                <a:solidFill>
-                  <a:schemeClr val="accent4"/>
-                </a:solidFill>
-                <a:effectLst/>
-                <a:uLnTx/>
-                <a:uFillTx/>
-                <a:latin typeface="+mj-lt"/>
-                <a:ea typeface="+mn-ea"/>
-                <a:cs typeface="Biome Light" panose="020B0303030204020804" pitchFamily="34" charset="0"/>
-              </a:rPr>
-              <a:t>cadamic</a:t>
-            </a:r>
-            <a:r>
-              <a:rPr kumimoji="0" lang="en-US" b="1" i="0" u="none" strike="noStrike" kern="1200" cap="none" spc="0" normalizeH="0" baseline="0" noProof="0" dirty="0">
-                <a:ln>
-                  <a:noFill/>
-                </a:ln>
-                <a:solidFill>
-                  <a:schemeClr val="accent4"/>
-                </a:solidFill>
-                <a:effectLst/>
-                <a:uLnTx/>
-                <a:uFillTx/>
-                <a:latin typeface="+mj-lt"/>
-                <a:ea typeface="+mn-ea"/>
-                <a:cs typeface="Biome Light" panose="020B0303030204020804" pitchFamily="34" charset="0"/>
-              </a:rPr>
-              <a:t> Growth</a:t>
-            </a:r>
-          </a:p>
-          <a:p>
-            <a:pPr marL="0" marR="0" lvl="0" indent="0" algn="l" defTabSz="914400" rtl="0" eaLnBrk="1" fontAlgn="auto" latinLnBrk="0" hangingPunct="1">
-              <a:lnSpc>
-                <a:spcPct val="90000"/>
-              </a:lnSpc>
-              <a:spcBef>
-                <a:spcPts val="1000"/>
-              </a:spcBef>
-              <a:spcAft>
-                <a:spcPts val="0"/>
-              </a:spcAft>
-              <a:buClrTx/>
-              <a:buSzTx/>
-              <a:buFont typeface="Arial" panose="020B0604020202020204" pitchFamily="34" charset="0"/>
-              <a:buNone/>
-              <a:tabLst/>
-              <a:defRPr/>
-            </a:pPr>
-            <a:r>
-              <a:rPr kumimoji="0" lang="en-US" sz="1600" b="0" i="0" u="none" strike="noStrike" kern="1200" cap="none" spc="0" normalizeH="0" baseline="0" noProof="0" dirty="0">
-                <a:ln>
-                  <a:noFill/>
-                </a:ln>
-                <a:effectLst/>
-                <a:uLnTx/>
-                <a:uFillTx/>
-                <a:latin typeface="+mn-lt"/>
-                <a:ea typeface="+mn-ea"/>
-                <a:cs typeface="Biome Light" panose="020B0303030204020804" pitchFamily="34" charset="0"/>
-              </a:rPr>
-              <a:t>Emerging frameworks and libraries are being used so upgrading will be easy.</a:t>
-            </a:r>
-          </a:p>
-        </p:txBody>
-      </p:sp>
-      <p:sp>
-        <p:nvSpPr>
-          <p:cNvPr id="19" name="Hexagon 18">
-            <a:extLst>
-              <a:ext uri="{FF2B5EF4-FFF2-40B4-BE49-F238E27FC236}">
-                <a16:creationId xmlns:a16="http://schemas.microsoft.com/office/drawing/2014/main" id="{A6510D74-8CDF-4500-996B-40C07942D72B}"/>
-              </a:ext>
-              <a:ext uri="{C183D7F6-B498-43B3-948B-1728B52AA6E4}">
-                <adec:decorative xmlns:adec="http://schemas.microsoft.com/office/drawing/2017/decorative" val="1"/>
-              </a:ext>
-            </a:extLst>
-          </p:cNvPr>
-          <p:cNvSpPr/>
-          <p:nvPr/>
-        </p:nvSpPr>
-        <p:spPr>
-          <a:xfrm>
-            <a:off x="609018" y="3510536"/>
-            <a:ext cx="914400" cy="764219"/>
-          </a:xfrm>
-          <a:prstGeom prst="hexagon">
-            <a:avLst/>
-          </a:prstGeom>
-          <a:noFill/>
-          <a:ln>
-            <a:solidFill>
-              <a:schemeClr val="bg1">
-                <a:lumMod val="75000"/>
-              </a:schemeClr>
-            </a:solidFill>
-          </a:ln>
-        </p:spPr>
-        <p:style>
-          <a:lnRef idx="2">
-            <a:schemeClr val="accent1">
-              <a:shade val="50000"/>
-            </a:schemeClr>
-          </a:lnRef>
-          <a:fillRef idx="1">
-            <a:schemeClr val="accent1"/>
-          </a:fillRef>
-          <a:effectRef idx="0">
-            <a:schemeClr val="accent1"/>
-          </a:effectRef>
-          <a:fontRef idx="minor">
-            <a:schemeClr val="lt1"/>
-          </a:fontRef>
-        </p:style>
-        <p:txBody>
-          <a:bodyPr rtlCol="0" anchor="ctr"/>
-          <a:lstStyle/>
-          <a:p>
-            <a:pPr algn="ctr"/>
-            <a:endParaRPr lang="en-US" dirty="0"/>
-          </a:p>
-        </p:txBody>
-      </p:sp>
-      <p:pic>
-        <p:nvPicPr>
-          <p:cNvPr id="30" name="Graphic 29">
-            <a:extLst>
-              <a:ext uri="{FF2B5EF4-FFF2-40B4-BE49-F238E27FC236}">
-                <a16:creationId xmlns:a16="http://schemas.microsoft.com/office/drawing/2014/main" id="{245749D8-5A06-44F2-B96E-6718BBEB6C47}"/>
-              </a:ext>
-            </a:extLst>
-          </p:cNvPr>
-          <p:cNvPicPr>
-            <a:picLocks noChangeAspect="1"/>
-          </p:cNvPicPr>
-          <p:nvPr/>
-        </p:nvPicPr>
-        <p:blipFill>
-          <a:blip r:embed="rId7">
-            <a:extLst>
-              <a:ext uri="{837473B0-CC2E-450A-ABE3-18F120FF3D39}">
-                <a1611:picAttrSrcUrl xmlns:a1611="http://schemas.microsoft.com/office/drawing/2016/11/main" r:id="rId8"/>
-              </a:ext>
-            </a:extLst>
-          </a:blip>
-          <a:srcRect/>
-          <a:stretch/>
-        </p:blipFill>
-        <p:spPr>
-          <a:xfrm>
-            <a:off x="793513" y="3618467"/>
-            <a:ext cx="548640" cy="548640"/>
-          </a:xfrm>
-          <a:prstGeom prst="rect">
-            <a:avLst/>
-          </a:prstGeom>
-        </p:spPr>
-      </p:pic>
-      <p:sp>
-        <p:nvSpPr>
-          <p:cNvPr id="13" name="TextBox 12">
-            <a:extLst>
-              <a:ext uri="{FF2B5EF4-FFF2-40B4-BE49-F238E27FC236}">
-                <a16:creationId xmlns:a16="http://schemas.microsoft.com/office/drawing/2014/main" id="{E0A3F38B-310F-454B-9EF6-EF4B5FD017B0}"/>
-              </a:ext>
-            </a:extLst>
-          </p:cNvPr>
-          <p:cNvSpPr txBox="1"/>
-          <p:nvPr/>
-        </p:nvSpPr>
-        <p:spPr>
-          <a:xfrm>
-            <a:off x="1748531" y="3531563"/>
-            <a:ext cx="3657600" cy="913070"/>
-          </a:xfrm>
-          <a:prstGeom prst="rect">
-            <a:avLst/>
-          </a:prstGeom>
-          <a:noFill/>
-        </p:spPr>
-        <p:txBody>
-          <a:bodyPr wrap="square">
-            <a:spAutoFit/>
-          </a:bodyPr>
-          <a:lstStyle/>
-          <a:p>
-            <a:pPr marL="0" marR="0" lvl="0" indent="0" algn="l" defTabSz="914400" rtl="0" eaLnBrk="1" fontAlgn="auto" latinLnBrk="0" hangingPunct="1">
-              <a:lnSpc>
-                <a:spcPct val="90000"/>
-              </a:lnSpc>
-              <a:spcBef>
-                <a:spcPts val="1000"/>
-              </a:spcBef>
-              <a:spcAft>
-                <a:spcPts val="0"/>
-              </a:spcAft>
-              <a:buClrTx/>
-              <a:buSzTx/>
-              <a:buFont typeface="Arial" panose="020B0604020202020204" pitchFamily="34" charset="0"/>
-              <a:buNone/>
-              <a:tabLst/>
-              <a:defRPr/>
-            </a:pPr>
-            <a:r>
-              <a:rPr kumimoji="0" lang="en-US" b="1" i="0" u="none" strike="noStrike" kern="1200" cap="none" spc="0" normalizeH="0" baseline="0" noProof="0" dirty="0">
-                <a:ln>
-                  <a:noFill/>
-                </a:ln>
-                <a:solidFill>
-                  <a:schemeClr val="accent4"/>
-                </a:solidFill>
-                <a:effectLst/>
-                <a:uLnTx/>
-                <a:uFillTx/>
-                <a:latin typeface="+mj-lt"/>
-                <a:ea typeface="+mn-ea"/>
-                <a:cs typeface="Biome Light" panose="020B0303030204020804" pitchFamily="34" charset="0"/>
-              </a:rPr>
-              <a:t>Alumni Association</a:t>
-            </a:r>
-          </a:p>
-          <a:p>
-            <a:pPr marL="0" marR="0" lvl="0" indent="0" algn="l" defTabSz="914400" rtl="0" eaLnBrk="1" fontAlgn="auto" latinLnBrk="0" hangingPunct="1">
-              <a:lnSpc>
-                <a:spcPct val="90000"/>
-              </a:lnSpc>
-              <a:spcBef>
-                <a:spcPts val="1000"/>
-              </a:spcBef>
-              <a:spcAft>
-                <a:spcPts val="0"/>
-              </a:spcAft>
-              <a:buClrTx/>
-              <a:buSzTx/>
-              <a:buFont typeface="Arial" panose="020B0604020202020204" pitchFamily="34" charset="0"/>
-              <a:buNone/>
-              <a:tabLst/>
-              <a:defRPr/>
-            </a:pPr>
-            <a:r>
-              <a:rPr kumimoji="0" lang="en-US" sz="1600" b="0" i="0" u="none" strike="noStrike" kern="1200" cap="none" spc="0" normalizeH="0" baseline="0" noProof="0" dirty="0">
-                <a:ln>
-                  <a:noFill/>
-                </a:ln>
-                <a:effectLst/>
-                <a:uLnTx/>
-                <a:uFillTx/>
-                <a:latin typeface="+mn-lt"/>
-                <a:ea typeface="+mn-ea"/>
-                <a:cs typeface="Biome Light" panose="020B0303030204020804" pitchFamily="34" charset="0"/>
-              </a:rPr>
-              <a:t>The community will be always active with the help of alumni’s of the organization.</a:t>
-            </a:r>
-          </a:p>
-        </p:txBody>
-      </p:sp>
-      <p:sp>
-        <p:nvSpPr>
-          <p:cNvPr id="26" name="Hexagon 25">
-            <a:extLst>
-              <a:ext uri="{FF2B5EF4-FFF2-40B4-BE49-F238E27FC236}">
-                <a16:creationId xmlns:a16="http://schemas.microsoft.com/office/drawing/2014/main" id="{F73E68A5-255F-4C3B-82E4-28F5CE1AA4BA}"/>
-              </a:ext>
-              <a:ext uri="{C183D7F6-B498-43B3-948B-1728B52AA6E4}">
-                <adec:decorative xmlns:adec="http://schemas.microsoft.com/office/drawing/2017/decorative" val="1"/>
-              </a:ext>
-            </a:extLst>
-          </p:cNvPr>
-          <p:cNvSpPr/>
-          <p:nvPr/>
-        </p:nvSpPr>
-        <p:spPr>
-          <a:xfrm>
-            <a:off x="6382827" y="3510536"/>
-            <a:ext cx="914400" cy="764219"/>
-          </a:xfrm>
-          <a:prstGeom prst="hexagon">
-            <a:avLst/>
-          </a:prstGeom>
-          <a:noFill/>
-          <a:ln>
-            <a:solidFill>
-              <a:schemeClr val="bg1">
-                <a:lumMod val="75000"/>
-              </a:schemeClr>
-            </a:solidFill>
-          </a:ln>
-        </p:spPr>
-        <p:style>
-          <a:lnRef idx="2">
-            <a:schemeClr val="accent1">
-              <a:shade val="50000"/>
-            </a:schemeClr>
-          </a:lnRef>
-          <a:fillRef idx="1">
-            <a:schemeClr val="accent1"/>
-          </a:fillRef>
-          <a:effectRef idx="0">
-            <a:schemeClr val="accent1"/>
-          </a:effectRef>
-          <a:fontRef idx="minor">
-            <a:schemeClr val="lt1"/>
-          </a:fontRef>
-        </p:style>
-        <p:txBody>
-          <a:bodyPr rtlCol="0" anchor="ctr"/>
-          <a:lstStyle/>
-          <a:p>
-            <a:pPr algn="ctr"/>
-            <a:endParaRPr lang="en-US" dirty="0"/>
-          </a:p>
-        </p:txBody>
-      </p:sp>
-      <p:pic>
-        <p:nvPicPr>
-          <p:cNvPr id="36" name="Graphic 35" descr="Clipboard">
-            <a:extLst>
-              <a:ext uri="{FF2B5EF4-FFF2-40B4-BE49-F238E27FC236}">
-                <a16:creationId xmlns:a16="http://schemas.microsoft.com/office/drawing/2014/main" id="{3F4B17BF-671E-4F42-AB1B-F84F52DCE251}"/>
-              </a:ext>
-            </a:extLst>
-          </p:cNvPr>
-          <p:cNvPicPr>
-            <a:picLocks noChangeAspect="1"/>
-          </p:cNvPicPr>
-          <p:nvPr/>
-        </p:nvPicPr>
-        <p:blipFill>
-          <a:blip r:embed="rId9">
-            <a:extLst>
-              <a:ext uri="{96DAC541-7B7A-43D3-8B79-37D633B846F1}">
-                <asvg:svgBlip xmlns:asvg="http://schemas.microsoft.com/office/drawing/2016/SVG/main" r:embed="rId10"/>
-              </a:ext>
-            </a:extLst>
-          </a:blip>
-          <a:srcRect/>
-          <a:stretch/>
-        </p:blipFill>
-        <p:spPr>
-          <a:xfrm>
-            <a:off x="6573648" y="3606850"/>
-            <a:ext cx="548640" cy="548640"/>
-          </a:xfrm>
-          <a:prstGeom prst="rect">
-            <a:avLst/>
-          </a:prstGeom>
-        </p:spPr>
-      </p:pic>
-      <p:sp>
-        <p:nvSpPr>
-          <p:cNvPr id="9" name="TextBox 8">
-            <a:extLst>
-              <a:ext uri="{FF2B5EF4-FFF2-40B4-BE49-F238E27FC236}">
-                <a16:creationId xmlns:a16="http://schemas.microsoft.com/office/drawing/2014/main" id="{BBD1A11C-0D13-40D5-A96C-6C9C65FDED12}"/>
-              </a:ext>
-            </a:extLst>
-          </p:cNvPr>
-          <p:cNvSpPr txBox="1"/>
-          <p:nvPr/>
-        </p:nvSpPr>
-        <p:spPr>
-          <a:xfrm>
-            <a:off x="7504954" y="3531563"/>
-            <a:ext cx="3657600" cy="913070"/>
-          </a:xfrm>
-          <a:prstGeom prst="rect">
-            <a:avLst/>
-          </a:prstGeom>
-          <a:noFill/>
-        </p:spPr>
-        <p:txBody>
-          <a:bodyPr wrap="square">
-            <a:spAutoFit/>
-          </a:bodyPr>
-          <a:lstStyle/>
-          <a:p>
-            <a:pPr marL="0" marR="0" lvl="0" indent="0" algn="l" defTabSz="914400" rtl="0" eaLnBrk="1" fontAlgn="auto" latinLnBrk="0" hangingPunct="1">
-              <a:lnSpc>
-                <a:spcPct val="90000"/>
-              </a:lnSpc>
-              <a:spcBef>
-                <a:spcPts val="1000"/>
-              </a:spcBef>
-              <a:spcAft>
-                <a:spcPts val="0"/>
-              </a:spcAft>
-              <a:buClrTx/>
-              <a:buSzTx/>
-              <a:buFont typeface="Arial" panose="020B0604020202020204" pitchFamily="34" charset="0"/>
-              <a:buNone/>
-              <a:tabLst/>
-              <a:defRPr/>
-            </a:pPr>
-            <a:r>
-              <a:rPr kumimoji="0" lang="en-US" b="1" i="0" u="none" strike="noStrike" kern="1200" cap="none" spc="0" normalizeH="0" baseline="0" noProof="0" dirty="0">
-                <a:ln>
-                  <a:noFill/>
-                </a:ln>
-                <a:solidFill>
-                  <a:schemeClr val="accent4"/>
-                </a:solidFill>
-                <a:effectLst/>
-                <a:uLnTx/>
-                <a:uFillTx/>
-                <a:latin typeface="+mj-lt"/>
-                <a:ea typeface="+mn-ea"/>
-                <a:cs typeface="Biome Light" panose="020B0303030204020804" pitchFamily="34" charset="0"/>
-              </a:rPr>
-              <a:t>User Friendly  and Secured</a:t>
-            </a:r>
-          </a:p>
-          <a:p>
-            <a:pPr marL="0" marR="0" lvl="0" indent="0" algn="l" defTabSz="914400" rtl="0" eaLnBrk="1" fontAlgn="auto" latinLnBrk="0" hangingPunct="1">
-              <a:lnSpc>
-                <a:spcPct val="90000"/>
-              </a:lnSpc>
-              <a:spcBef>
-                <a:spcPts val="1000"/>
-              </a:spcBef>
-              <a:spcAft>
-                <a:spcPts val="0"/>
-              </a:spcAft>
-              <a:buClrTx/>
-              <a:buSzTx/>
-              <a:buFont typeface="Arial" panose="020B0604020202020204" pitchFamily="34" charset="0"/>
-              <a:buNone/>
-              <a:tabLst/>
-              <a:defRPr/>
-            </a:pPr>
-            <a:r>
-              <a:rPr kumimoji="0" lang="en-US" sz="1600" b="0" i="0" u="none" strike="noStrike" kern="1200" cap="none" spc="0" normalizeH="0" baseline="0" noProof="0" dirty="0">
-                <a:ln>
-                  <a:noFill/>
-                </a:ln>
-                <a:effectLst/>
-                <a:uLnTx/>
-                <a:uFillTx/>
-                <a:latin typeface="+mn-lt"/>
-                <a:ea typeface="+mn-ea"/>
-                <a:cs typeface="Biome Light" panose="020B0303030204020804" pitchFamily="34" charset="0"/>
-              </a:rPr>
-              <a:t>Easy to request for funds through online and easy withdrawal.</a:t>
-            </a:r>
-          </a:p>
-        </p:txBody>
-      </p:sp>
-      <p:sp>
-        <p:nvSpPr>
-          <p:cNvPr id="20" name="Hexagon 19">
-            <a:extLst>
-              <a:ext uri="{FF2B5EF4-FFF2-40B4-BE49-F238E27FC236}">
-                <a16:creationId xmlns:a16="http://schemas.microsoft.com/office/drawing/2014/main" id="{E3AEA7C5-E53C-47EB-B54E-E09414923CE6}"/>
-              </a:ext>
-              <a:ext uri="{C183D7F6-B498-43B3-948B-1728B52AA6E4}">
-                <adec:decorative xmlns:adec="http://schemas.microsoft.com/office/drawing/2017/decorative" val="1"/>
-              </a:ext>
-            </a:extLst>
-          </p:cNvPr>
-          <p:cNvSpPr/>
-          <p:nvPr/>
-        </p:nvSpPr>
-        <p:spPr>
-          <a:xfrm>
-            <a:off x="609017" y="4778318"/>
-            <a:ext cx="914400" cy="764219"/>
-          </a:xfrm>
-          <a:prstGeom prst="hexagon">
-            <a:avLst/>
-          </a:prstGeom>
-          <a:noFill/>
-          <a:ln>
-            <a:solidFill>
-              <a:schemeClr val="bg1">
-                <a:lumMod val="75000"/>
-              </a:schemeClr>
-            </a:solidFill>
-          </a:ln>
-        </p:spPr>
-        <p:style>
-          <a:lnRef idx="2">
-            <a:schemeClr val="accent1">
-              <a:shade val="50000"/>
-            </a:schemeClr>
-          </a:lnRef>
-          <a:fillRef idx="1">
-            <a:schemeClr val="accent1"/>
-          </a:fillRef>
-          <a:effectRef idx="0">
-            <a:schemeClr val="accent1"/>
-          </a:effectRef>
-          <a:fontRef idx="minor">
-            <a:schemeClr val="lt1"/>
-          </a:fontRef>
-        </p:style>
-        <p:txBody>
-          <a:bodyPr rtlCol="0" anchor="ctr"/>
-          <a:lstStyle/>
-          <a:p>
-            <a:pPr algn="ctr"/>
-            <a:endParaRPr lang="en-US" dirty="0"/>
-          </a:p>
-        </p:txBody>
-      </p:sp>
-      <p:pic>
-        <p:nvPicPr>
-          <p:cNvPr id="32" name="Graphic 31" descr="User network">
-            <a:extLst>
-              <a:ext uri="{FF2B5EF4-FFF2-40B4-BE49-F238E27FC236}">
-                <a16:creationId xmlns:a16="http://schemas.microsoft.com/office/drawing/2014/main" id="{B6919A3F-A031-4557-AAC9-0C948C6E4D6A}"/>
-              </a:ext>
-            </a:extLst>
-          </p:cNvPr>
-          <p:cNvPicPr>
-            <a:picLocks noChangeAspect="1"/>
-          </p:cNvPicPr>
-          <p:nvPr/>
-        </p:nvPicPr>
-        <p:blipFill>
-          <a:blip r:embed="rId11">
-            <a:extLst>
-              <a:ext uri="{96DAC541-7B7A-43D3-8B79-37D633B846F1}">
-                <asvg:svgBlip xmlns:asvg="http://schemas.microsoft.com/office/drawing/2016/SVG/main" r:embed="rId12"/>
-              </a:ext>
-            </a:extLst>
-          </a:blip>
-          <a:srcRect/>
-          <a:stretch/>
-        </p:blipFill>
-        <p:spPr>
-          <a:xfrm>
-            <a:off x="793513" y="4872722"/>
-            <a:ext cx="548640" cy="548640"/>
-          </a:xfrm>
-          <a:prstGeom prst="rect">
-            <a:avLst/>
-          </a:prstGeom>
-        </p:spPr>
-      </p:pic>
-      <p:sp>
-        <p:nvSpPr>
-          <p:cNvPr id="17" name="TextBox 16">
-            <a:extLst>
-              <a:ext uri="{FF2B5EF4-FFF2-40B4-BE49-F238E27FC236}">
-                <a16:creationId xmlns:a16="http://schemas.microsoft.com/office/drawing/2014/main" id="{4B6D4D59-1662-44D5-B239-F9F86487BE32}"/>
-              </a:ext>
-            </a:extLst>
-          </p:cNvPr>
-          <p:cNvSpPr txBox="1"/>
-          <p:nvPr/>
-        </p:nvSpPr>
-        <p:spPr>
-          <a:xfrm>
-            <a:off x="1748531" y="4723888"/>
-            <a:ext cx="3657600" cy="913070"/>
-          </a:xfrm>
-          <a:prstGeom prst="rect">
-            <a:avLst/>
-          </a:prstGeom>
-          <a:noFill/>
-        </p:spPr>
-        <p:txBody>
-          <a:bodyPr wrap="square">
-            <a:spAutoFit/>
-          </a:bodyPr>
-          <a:lstStyle/>
-          <a:p>
-            <a:pPr marL="0" marR="0" lvl="0" indent="0" algn="l" defTabSz="914400" rtl="0" eaLnBrk="1" fontAlgn="auto" latinLnBrk="0" hangingPunct="1">
-              <a:lnSpc>
-                <a:spcPct val="90000"/>
-              </a:lnSpc>
-              <a:spcBef>
-                <a:spcPts val="1000"/>
-              </a:spcBef>
-              <a:spcAft>
-                <a:spcPts val="0"/>
-              </a:spcAft>
-              <a:buClrTx/>
-              <a:buSzTx/>
-              <a:buFont typeface="Arial" panose="020B0604020202020204" pitchFamily="34" charset="0"/>
-              <a:buNone/>
-              <a:tabLst/>
-              <a:defRPr/>
-            </a:pPr>
-            <a:r>
-              <a:rPr kumimoji="0" lang="en-US" b="1" i="0" u="none" strike="noStrike" kern="1200" cap="none" spc="0" normalizeH="0" baseline="0" noProof="0" dirty="0">
-                <a:ln>
-                  <a:noFill/>
-                </a:ln>
-                <a:solidFill>
-                  <a:schemeClr val="accent4"/>
-                </a:solidFill>
-                <a:effectLst/>
-                <a:uLnTx/>
-                <a:uFillTx/>
-                <a:latin typeface="+mj-lt"/>
-                <a:ea typeface="+mn-ea"/>
-                <a:cs typeface="Biome Light" panose="020B0303030204020804" pitchFamily="34" charset="0"/>
-              </a:rPr>
-              <a:t>Unity is Power</a:t>
-            </a:r>
-          </a:p>
-          <a:p>
-            <a:pPr marL="0" marR="0" lvl="0" indent="0" algn="l" defTabSz="914400" rtl="0" eaLnBrk="1" fontAlgn="auto" latinLnBrk="0" hangingPunct="1">
-              <a:lnSpc>
-                <a:spcPct val="90000"/>
-              </a:lnSpc>
-              <a:spcBef>
-                <a:spcPts val="1000"/>
-              </a:spcBef>
-              <a:spcAft>
-                <a:spcPts val="0"/>
-              </a:spcAft>
-              <a:buClrTx/>
-              <a:buSzTx/>
-              <a:buFont typeface="Arial" panose="020B0604020202020204" pitchFamily="34" charset="0"/>
-              <a:buNone/>
-              <a:tabLst/>
-              <a:defRPr/>
-            </a:pPr>
-            <a:r>
-              <a:rPr lang="en-US" sz="1600" dirty="0">
-                <a:cs typeface="Biome Light" panose="020B0303030204020804" pitchFamily="34" charset="0"/>
-              </a:rPr>
-              <a:t>Every single cent donate by community members will glow a students life.</a:t>
-            </a:r>
-            <a:endParaRPr lang="en-US" sz="1600" dirty="0"/>
-          </a:p>
-        </p:txBody>
-      </p:sp>
-      <p:sp>
-        <p:nvSpPr>
-          <p:cNvPr id="28" name="Hexagon 27">
-            <a:extLst>
-              <a:ext uri="{FF2B5EF4-FFF2-40B4-BE49-F238E27FC236}">
-                <a16:creationId xmlns:a16="http://schemas.microsoft.com/office/drawing/2014/main" id="{BC618CE4-6DEC-4D26-B202-8BAAA269727E}"/>
-              </a:ext>
-              <a:ext uri="{C183D7F6-B498-43B3-948B-1728B52AA6E4}">
-                <adec:decorative xmlns:adec="http://schemas.microsoft.com/office/drawing/2017/decorative" val="1"/>
-              </a:ext>
-            </a:extLst>
-          </p:cNvPr>
-          <p:cNvSpPr/>
-          <p:nvPr/>
-        </p:nvSpPr>
-        <p:spPr>
-          <a:xfrm>
-            <a:off x="6382826" y="4778318"/>
-            <a:ext cx="914400" cy="764219"/>
-          </a:xfrm>
-          <a:prstGeom prst="hexagon">
-            <a:avLst/>
-          </a:prstGeom>
-          <a:noFill/>
-          <a:ln>
-            <a:solidFill>
-              <a:schemeClr val="bg1">
-                <a:lumMod val="75000"/>
-              </a:schemeClr>
-            </a:solidFill>
-          </a:ln>
-        </p:spPr>
-        <p:style>
-          <a:lnRef idx="2">
-            <a:schemeClr val="accent1">
-              <a:shade val="50000"/>
-            </a:schemeClr>
-          </a:lnRef>
-          <a:fillRef idx="1">
-            <a:schemeClr val="accent1"/>
-          </a:fillRef>
-          <a:effectRef idx="0">
-            <a:schemeClr val="accent1"/>
-          </a:effectRef>
-          <a:fontRef idx="minor">
-            <a:schemeClr val="lt1"/>
-          </a:fontRef>
-        </p:style>
-        <p:txBody>
-          <a:bodyPr rtlCol="0" anchor="ctr"/>
-          <a:lstStyle/>
-          <a:p>
-            <a:pPr algn="ctr"/>
-            <a:endParaRPr lang="en-US" dirty="0"/>
-          </a:p>
-        </p:txBody>
-      </p:sp>
-      <p:pic>
-        <p:nvPicPr>
-          <p:cNvPr id="38" name="Graphic 37" descr="Megaphone1">
-            <a:extLst>
-              <a:ext uri="{FF2B5EF4-FFF2-40B4-BE49-F238E27FC236}">
-                <a16:creationId xmlns:a16="http://schemas.microsoft.com/office/drawing/2014/main" id="{44B68078-72CC-45F5-9CD3-20C37D3298D8}"/>
-              </a:ext>
-            </a:extLst>
-          </p:cNvPr>
-          <p:cNvPicPr>
-            <a:picLocks noChangeAspect="1"/>
-          </p:cNvPicPr>
-          <p:nvPr/>
-        </p:nvPicPr>
-        <p:blipFill>
-          <a:blip r:embed="rId13">
-            <a:extLst>
-              <a:ext uri="{96DAC541-7B7A-43D3-8B79-37D633B846F1}">
-                <asvg:svgBlip xmlns:asvg="http://schemas.microsoft.com/office/drawing/2016/SVG/main" r:embed="rId14"/>
-              </a:ext>
-            </a:extLst>
-          </a:blip>
-          <a:srcRect/>
-          <a:stretch/>
-        </p:blipFill>
-        <p:spPr>
-          <a:xfrm>
-            <a:off x="6573648" y="4861105"/>
-            <a:ext cx="548640" cy="548640"/>
-          </a:xfrm>
-          <a:prstGeom prst="rect">
-            <a:avLst/>
-          </a:prstGeom>
-        </p:spPr>
-      </p:pic>
-      <p:sp>
-        <p:nvSpPr>
-          <p:cNvPr id="15" name="TextBox 14">
-            <a:extLst>
-              <a:ext uri="{FF2B5EF4-FFF2-40B4-BE49-F238E27FC236}">
-                <a16:creationId xmlns:a16="http://schemas.microsoft.com/office/drawing/2014/main" id="{802A63E6-17C3-4C42-AD30-C1D1236CE8C7}"/>
-              </a:ext>
-            </a:extLst>
-          </p:cNvPr>
-          <p:cNvSpPr txBox="1"/>
-          <p:nvPr/>
-        </p:nvSpPr>
-        <p:spPr>
-          <a:xfrm>
-            <a:off x="7504954" y="4723888"/>
-            <a:ext cx="3657600" cy="1134670"/>
-          </a:xfrm>
-          <a:prstGeom prst="rect">
-            <a:avLst/>
-          </a:prstGeom>
-          <a:noFill/>
-        </p:spPr>
-        <p:txBody>
-          <a:bodyPr wrap="square">
-            <a:spAutoFit/>
-          </a:bodyPr>
-          <a:lstStyle/>
-          <a:p>
-            <a:pPr marL="0" marR="0" lvl="0" indent="0" algn="l" defTabSz="914400" rtl="0" eaLnBrk="1" fontAlgn="auto" latinLnBrk="0" hangingPunct="1">
-              <a:lnSpc>
-                <a:spcPct val="90000"/>
-              </a:lnSpc>
-              <a:spcBef>
-                <a:spcPts val="1000"/>
-              </a:spcBef>
-              <a:spcAft>
-                <a:spcPts val="0"/>
-              </a:spcAft>
-              <a:buClrTx/>
-              <a:buSzTx/>
-              <a:buFont typeface="Arial" panose="020B0604020202020204" pitchFamily="34" charset="0"/>
-              <a:buNone/>
-              <a:tabLst/>
-              <a:defRPr/>
-            </a:pPr>
-            <a:r>
-              <a:rPr kumimoji="0" lang="en-US" b="1" i="0" u="none" strike="noStrike" kern="1200" cap="none" spc="0" normalizeH="0" baseline="0" noProof="0" dirty="0">
-                <a:ln>
-                  <a:noFill/>
-                </a:ln>
-                <a:solidFill>
-                  <a:schemeClr val="accent4"/>
-                </a:solidFill>
-                <a:effectLst/>
-                <a:uLnTx/>
-                <a:uFillTx/>
-                <a:latin typeface="+mj-lt"/>
-                <a:ea typeface="+mn-ea"/>
-                <a:cs typeface="Biome Light" panose="020B0303030204020804" pitchFamily="34" charset="0"/>
-              </a:rPr>
-              <a:t>Emotional Attachment</a:t>
-            </a:r>
-          </a:p>
-          <a:p>
-            <a:pPr marL="0" marR="0" lvl="0" indent="0" algn="l" defTabSz="914400" rtl="0" eaLnBrk="1" fontAlgn="auto" latinLnBrk="0" hangingPunct="1">
-              <a:lnSpc>
-                <a:spcPct val="90000"/>
-              </a:lnSpc>
-              <a:spcBef>
-                <a:spcPts val="1000"/>
-              </a:spcBef>
-              <a:spcAft>
-                <a:spcPts val="0"/>
-              </a:spcAft>
-              <a:buClrTx/>
-              <a:buSzTx/>
-              <a:buFont typeface="Arial" panose="020B0604020202020204" pitchFamily="34" charset="0"/>
-              <a:buNone/>
-              <a:tabLst/>
-              <a:defRPr/>
-            </a:pPr>
-            <a:r>
-              <a:rPr lang="en-US" sz="1600" dirty="0">
-                <a:cs typeface="Biome Light" panose="020B0303030204020804" pitchFamily="34" charset="0"/>
-              </a:rPr>
-              <a:t>Cause of emotional attachment between the students on the organization crowdfunding will be successful.</a:t>
-            </a:r>
-            <a:endParaRPr lang="en-US" sz="1600" dirty="0"/>
-          </a:p>
-        </p:txBody>
-      </p:sp>
-    </p:spTree>
-    <p:extLst>
-      <p:ext uri="{BB962C8B-B14F-4D97-AF65-F5344CB8AC3E}">
-        <p14:creationId xmlns:p14="http://schemas.microsoft.com/office/powerpoint/2010/main" val="4120671462"/>
-      </p:ext>
-    </p:extLst>
-  </p:cSld>
-  <p:clrMapOvr>
-    <a:masterClrMapping/>
-  </p:clrMapOvr>
-</p:sld>
-</file>
-
-<file path=ppt/slides/slide6.xml><?xml version="1.0" encoding="utf-8"?>
 <p:sld xmlns:a="http://schemas.openxmlformats.org/drawingml/2006/main" xmlns:r="http://schemas.openxmlformats.org/officeDocument/2006/relationships" xmlns:p="http://schemas.openxmlformats.org/presentationml/2006/main">
   <p:cSld>
     <p:spTree>
@@ -12795,7 +11488,7 @@
 </p:sld>
 </file>
 
-<file path=ppt/slides/slide7.xml><?xml version="1.0" encoding="utf-8"?>
+<file path=ppt/slides/slide6.xml><?xml version="1.0" encoding="utf-8"?>
 <p:sld xmlns:a="http://schemas.openxmlformats.org/drawingml/2006/main" xmlns:r="http://schemas.openxmlformats.org/officeDocument/2006/relationships" xmlns:p="http://schemas.openxmlformats.org/presentationml/2006/main">
   <p:cSld>
     <p:bg>
@@ -13808,6 +12501,15 @@
 </file>
 
 <file path=customXml/item1.xml><?xml version="1.0" encoding="utf-8"?>
+<?mso-contentType ?>
+<FormTemplates xmlns="http://schemas.microsoft.com/sharepoint/v3/contenttype/forms">
+  <Display>DocumentLibraryForm</Display>
+  <Edit>DocumentLibraryForm</Edit>
+  <New>DocumentLibraryForm</New>
+</FormTemplates>
+</file>
+
+<file path=customXml/item2.xml><?xml version="1.0" encoding="utf-8"?>
 <ct:contentTypeSchema xmlns:ct="http://schemas.microsoft.com/office/2006/metadata/contentType" xmlns:ma="http://schemas.microsoft.com/office/2006/metadata/properties/metaAttributes" ct:_="" ma:_="" ma:contentTypeName="Document" ma:contentTypeID="0x01010079F111ED35F8CC479449609E8A0923A6" ma:contentTypeVersion="12" ma:contentTypeDescription="Create a new document." ma:contentTypeScope="" ma:versionID="426e97fa315356fffbdcd9876fe988c2">
   <xsd:schema xmlns:xsd="http://www.w3.org/2001/XMLSchema" xmlns:xs="http://www.w3.org/2001/XMLSchema" xmlns:p="http://schemas.microsoft.com/office/2006/metadata/properties" xmlns:ns2="71af3243-3dd4-4a8d-8c0d-dd76da1f02a5" xmlns:ns3="16c05727-aa75-4e4a-9b5f-8a80a1165891" targetNamespace="http://schemas.microsoft.com/office/2006/metadata/properties" ma:root="true" ma:fieldsID="14b8f0def80e6d70ce3def20c90759ae" ns2:_="" ns3:_="">
     <xsd:import namespace="71af3243-3dd4-4a8d-8c0d-dd76da1f02a5"/>
@@ -14028,15 +12730,6 @@
 </ct:contentTypeSchema>
 </file>
 
-<file path=customXml/item2.xml><?xml version="1.0" encoding="utf-8"?>
-<?mso-contentType ?>
-<FormTemplates xmlns="http://schemas.microsoft.com/sharepoint/v3/contenttype/forms">
-  <Display>DocumentLibraryForm</Display>
-  <Edit>DocumentLibraryForm</Edit>
-  <New>DocumentLibraryForm</New>
-</FormTemplates>
-</file>
-
 <file path=customXml/item3.xml><?xml version="1.0" encoding="utf-8"?>
 <p:properties xmlns:p="http://schemas.microsoft.com/office/2006/metadata/properties" xmlns:xsi="http://www.w3.org/2001/XMLSchema-instance" xmlns:pc="http://schemas.microsoft.com/office/infopath/2007/PartnerControls">
   <documentManagement>
@@ -14047,6 +12740,14 @@
 </file>
 
 <file path=customXml/itemProps1.xml><?xml version="1.0" encoding="utf-8"?>
+<ds:datastoreItem xmlns:ds="http://schemas.openxmlformats.org/officeDocument/2006/customXml" ds:itemID="{05D99ABA-76CE-4A8E-B5F0-C051B96628DE}">
+  <ds:schemaRefs>
+    <ds:schemaRef ds:uri="http://schemas.microsoft.com/sharepoint/v3/contenttype/forms"/>
+  </ds:schemaRefs>
+</ds:datastoreItem>
+</file>
+
+<file path=customXml/itemProps2.xml><?xml version="1.0" encoding="utf-8"?>
 <ds:datastoreItem xmlns:ds="http://schemas.openxmlformats.org/officeDocument/2006/customXml" ds:itemID="{B19EB750-A6DA-4BE8-B87B-FC499FE73360}">
   <ds:schemaRefs>
     <ds:schemaRef ds:uri="http://schemas.microsoft.com/office/2006/metadata/contentType"/>
@@ -14065,14 +12766,6 @@
 </ds:datastoreItem>
 </file>
 
-<file path=customXml/itemProps2.xml><?xml version="1.0" encoding="utf-8"?>
-<ds:datastoreItem xmlns:ds="http://schemas.openxmlformats.org/officeDocument/2006/customXml" ds:itemID="{05D99ABA-76CE-4A8E-B5F0-C051B96628DE}">
-  <ds:schemaRefs>
-    <ds:schemaRef ds:uri="http://schemas.microsoft.com/sharepoint/v3/contenttype/forms"/>
-  </ds:schemaRefs>
-</ds:datastoreItem>
-</file>
-
 <file path=customXml/itemProps3.xml><?xml version="1.0" encoding="utf-8"?>
 <ds:datastoreItem xmlns:ds="http://schemas.openxmlformats.org/officeDocument/2006/customXml" ds:itemID="{4DEA9014-ED64-4558-B1E1-D03F0EE32BEB}">
   <ds:schemaRefs>

</xml_diff>